<commit_message>
Arreglo tabla e imagenes. Realizado retoques
</commit_message>
<xml_diff>
--- a/Material/Presentación/Presentacion Final.pptx
+++ b/Material/Presentación/Presentacion Final.pptx
@@ -24164,7 +24164,7 @@
           <a:fontRef idx="minor"/>
         </p:style>
         <p:txBody>
-          <a:bodyPr lIns="0" tIns="0" rIns="0" bIns="0" anchor="b">
+          <a:bodyPr lIns="0" tIns="0" rIns="0" bIns="0" anchor="ctr">
             <a:noAutofit/>
           </a:bodyPr>
           <a:lstStyle/>
@@ -24175,7 +24175,7 @@
               </a:lnSpc>
             </a:pPr>
             <a:r>
-              <a:rPr lang="es-ES" sz="3200" b="1" strike="noStrike" spc="-1">
+              <a:rPr lang="es-ES" sz="3200" b="1" strike="noStrike" spc="-1" dirty="0">
                 <a:solidFill>
                   <a:srgbClr val="FFFFFF"/>
                 </a:solidFill>
@@ -24184,7 +24184,7 @@
               </a:rPr>
               <a:t>GRUPO DE DESARROLLO ADD</a:t>
             </a:r>
-            <a:endParaRPr lang="es-ES" sz="3200" b="0" strike="noStrike" spc="-1">
+            <a:endParaRPr lang="es-ES" sz="3200" b="0" strike="noStrike" spc="-1" dirty="0">
               <a:latin typeface="Arial"/>
             </a:endParaRPr>
           </a:p>
@@ -24292,7 +24292,7 @@
             <a:r>
               <a:rPr lang="es-ES" sz="3200" b="1" strike="noStrike" spc="-1" dirty="0">
                 <a:solidFill>
-                  <a:srgbClr val="C00000"/>
+                  <a:srgbClr val="FF5050"/>
                 </a:solidFill>
                 <a:latin typeface="Source Sans Pro Black"/>
                 <a:ea typeface="DejaVu Sans"/>
@@ -24302,7 +24302,7 @@
             <a:r>
               <a:rPr lang="es-ES" sz="3200" b="1" strike="noStrike" spc="-1" dirty="0" err="1">
                 <a:solidFill>
-                  <a:srgbClr val="C00000"/>
+                  <a:srgbClr val="FF5050"/>
                 </a:solidFill>
                 <a:latin typeface="Source Sans Pro Black"/>
                 <a:ea typeface="DejaVu Sans"/>
@@ -24311,7 +24311,7 @@
             </a:r>
             <a:endParaRPr lang="es-ES" sz="3200" b="0" strike="noStrike" spc="-1" dirty="0">
               <a:solidFill>
-                <a:srgbClr val="C00000"/>
+                <a:srgbClr val="FF5050"/>
               </a:solidFill>
               <a:latin typeface="Arial"/>
             </a:endParaRPr>
@@ -24398,7 +24398,7 @@
           <a:fontRef idx="minor"/>
         </p:style>
         <p:txBody>
-          <a:bodyPr lIns="0" tIns="0" rIns="0" bIns="0" anchor="b">
+          <a:bodyPr lIns="0" tIns="0" rIns="0" bIns="0" anchor="ctr">
             <a:noAutofit/>
           </a:bodyPr>
           <a:lstStyle/>
@@ -24409,7 +24409,7 @@
               </a:lnSpc>
             </a:pPr>
             <a:r>
-              <a:rPr lang="es-ES" sz="3200" b="1" strike="noStrike" spc="-1">
+              <a:rPr lang="es-ES" sz="4000" b="1" strike="noStrike" spc="-1" dirty="0">
                 <a:solidFill>
                   <a:srgbClr val="FFFFFF"/>
                 </a:solidFill>
@@ -24418,7 +24418,7 @@
               </a:rPr>
               <a:t>Requisitos No Funcionales</a:t>
             </a:r>
-            <a:endParaRPr lang="es-ES" sz="3200" b="0" strike="noStrike" spc="-1">
+            <a:endParaRPr lang="es-ES" sz="4000" b="0" strike="noStrike" spc="-1" dirty="0">
               <a:latin typeface="Arial"/>
             </a:endParaRPr>
           </a:p>
@@ -24457,7 +24457,7 @@
         </p:style>
         <p:txBody>
           <a:bodyPr lIns="0" tIns="0" rIns="0" bIns="0">
-            <a:normAutofit fontScale="98500"/>
+            <a:normAutofit fontScale="91000"/>
           </a:bodyPr>
           <a:lstStyle/>
           <a:p>
@@ -24682,7 +24682,7 @@
           <a:fontRef idx="minor"/>
         </p:style>
         <p:txBody>
-          <a:bodyPr lIns="0" tIns="0" rIns="0" bIns="0" anchor="b">
+          <a:bodyPr lIns="0" tIns="0" rIns="0" bIns="0" anchor="ctr">
             <a:noAutofit/>
           </a:bodyPr>
           <a:lstStyle/>
@@ -24693,7 +24693,7 @@
               </a:lnSpc>
             </a:pPr>
             <a:r>
-              <a:rPr lang="es-ES" sz="3200" b="1" strike="noStrike" spc="-1">
+              <a:rPr lang="es-ES" sz="3600" b="1" strike="noStrike" spc="-1" dirty="0">
                 <a:solidFill>
                   <a:srgbClr val="FFFFFF"/>
                 </a:solidFill>
@@ -24702,7 +24702,7 @@
               </a:rPr>
               <a:t>Requisitos Funcionales - Cliente</a:t>
             </a:r>
-            <a:endParaRPr lang="es-ES" sz="3200" b="0" strike="noStrike" spc="-1">
+            <a:endParaRPr lang="es-ES" sz="3600" b="0" strike="noStrike" spc="-1" dirty="0">
               <a:latin typeface="Arial"/>
             </a:endParaRPr>
           </a:p>
@@ -24741,7 +24741,7 @@
         </p:style>
         <p:txBody>
           <a:bodyPr lIns="0" tIns="0" rIns="0" bIns="0">
-            <a:normAutofit/>
+            <a:normAutofit lnSpcReduction="10000"/>
           </a:bodyPr>
           <a:lstStyle/>
           <a:p>
@@ -25040,7 +25040,7 @@
         </p:nvSpPr>
         <p:spPr>
           <a:xfrm>
-            <a:off x="360000" y="941360"/>
+            <a:off x="360000" y="369860"/>
             <a:ext cx="9358200" cy="802800"/>
           </a:xfrm>
           <a:prstGeom prst="rect">
@@ -25064,7 +25064,7 @@
           <a:fontRef idx="minor"/>
         </p:style>
         <p:txBody>
-          <a:bodyPr lIns="0" tIns="0" rIns="0" bIns="0" anchor="b">
+          <a:bodyPr lIns="0" tIns="0" rIns="0" bIns="0" anchor="ctr">
             <a:noAutofit/>
           </a:bodyPr>
           <a:lstStyle/>
@@ -25084,16 +25084,6 @@
               </a:rPr>
               <a:t>Requisitos Funcionales – Personal</a:t>
             </a:r>
-            <a:endParaRPr lang="es-ES" sz="3200" b="0" strike="noStrike" spc="-1" dirty="0">
-              <a:latin typeface="Arial"/>
-            </a:endParaRPr>
-          </a:p>
-          <a:p>
-            <a:pPr>
-              <a:lnSpc>
-                <a:spcPct val="100000"/>
-              </a:lnSpc>
-            </a:pPr>
             <a:endParaRPr lang="es-ES" sz="3200" b="0" strike="noStrike" spc="-1" dirty="0">
               <a:latin typeface="Arial"/>
             </a:endParaRPr>
@@ -25340,7 +25330,7 @@
           <a:fontRef idx="minor"/>
         </p:style>
         <p:txBody>
-          <a:bodyPr lIns="0" tIns="0" rIns="0" bIns="0" anchor="b">
+          <a:bodyPr lIns="0" tIns="0" rIns="0" bIns="0" anchor="ctr">
             <a:noAutofit/>
           </a:bodyPr>
           <a:lstStyle/>
@@ -25351,7 +25341,7 @@
               </a:lnSpc>
             </a:pPr>
             <a:r>
-              <a:rPr lang="es-ES" sz="3200" b="1" strike="noStrike" spc="-1">
+              <a:rPr lang="es-ES" sz="3200" b="1" strike="noStrike" spc="-1" dirty="0">
                 <a:solidFill>
                   <a:srgbClr val="FFFFFF"/>
                 </a:solidFill>
@@ -25360,7 +25350,7 @@
               </a:rPr>
               <a:t>Requisitos Funcionales - Gestión</a:t>
             </a:r>
-            <a:endParaRPr lang="es-ES" sz="3200" b="0" strike="noStrike" spc="-1">
+            <a:endParaRPr lang="es-ES" sz="3200" b="0" strike="noStrike" spc="-1" dirty="0">
               <a:latin typeface="Arial"/>
             </a:endParaRPr>
           </a:p>
@@ -25636,7 +25626,7 @@
           <a:fontRef idx="minor"/>
         </p:style>
         <p:txBody>
-          <a:bodyPr lIns="0" tIns="0" rIns="0" bIns="0" anchor="b">
+          <a:bodyPr lIns="0" tIns="0" rIns="0" bIns="0" anchor="ctr">
             <a:noAutofit/>
           </a:bodyPr>
           <a:lstStyle/>
@@ -25647,7 +25637,7 @@
               </a:lnSpc>
             </a:pPr>
             <a:r>
-              <a:rPr lang="es-ES" sz="3200" b="1" strike="noStrike" spc="-1">
+              <a:rPr lang="es-ES" sz="3200" b="1" strike="noStrike" spc="-1" dirty="0">
                 <a:solidFill>
                   <a:srgbClr val="FFFFFF"/>
                 </a:solidFill>
@@ -25656,7 +25646,7 @@
               </a:rPr>
               <a:t>Caso de Uso - Cliente</a:t>
             </a:r>
-            <a:endParaRPr lang="es-ES" sz="3200" b="0" strike="noStrike" spc="-1">
+            <a:endParaRPr lang="es-ES" sz="3200" b="0" strike="noStrike" spc="-1" dirty="0">
               <a:latin typeface="Arial"/>
             </a:endParaRPr>
           </a:p>
@@ -25742,7 +25732,7 @@
           <a:fontRef idx="minor"/>
         </p:style>
         <p:txBody>
-          <a:bodyPr lIns="0" tIns="0" rIns="0" bIns="0" anchor="b">
+          <a:bodyPr lIns="0" tIns="0" rIns="0" bIns="0" anchor="ctr">
             <a:noAutofit/>
           </a:bodyPr>
           <a:lstStyle/>
@@ -25753,7 +25743,7 @@
               </a:lnSpc>
             </a:pPr>
             <a:r>
-              <a:rPr lang="es-ES" sz="3200" b="1" strike="noStrike" spc="-1">
+              <a:rPr lang="es-ES" sz="3200" b="1" strike="noStrike" spc="-1" dirty="0">
                 <a:solidFill>
                   <a:srgbClr val="FFFFFF"/>
                 </a:solidFill>
@@ -25762,7 +25752,7 @@
               </a:rPr>
               <a:t>Caso de Uso - Personal</a:t>
             </a:r>
-            <a:endParaRPr lang="es-ES" sz="3200" b="0" strike="noStrike" spc="-1">
+            <a:endParaRPr lang="es-ES" sz="3200" b="0" strike="noStrike" spc="-1" dirty="0">
               <a:latin typeface="Arial"/>
             </a:endParaRPr>
           </a:p>
@@ -25848,7 +25838,7 @@
           <a:fontRef idx="minor"/>
         </p:style>
         <p:txBody>
-          <a:bodyPr lIns="0" tIns="0" rIns="0" bIns="0" anchor="b">
+          <a:bodyPr lIns="0" tIns="0" rIns="0" bIns="0" anchor="ctr">
             <a:noAutofit/>
           </a:bodyPr>
           <a:lstStyle/>
@@ -25859,7 +25849,7 @@
               </a:lnSpc>
             </a:pPr>
             <a:r>
-              <a:rPr lang="es-ES" sz="3200" b="1" strike="noStrike" spc="-1">
+              <a:rPr lang="es-ES" sz="3200" b="1" strike="noStrike" spc="-1" dirty="0">
                 <a:solidFill>
                   <a:srgbClr val="FFFFFF"/>
                 </a:solidFill>
@@ -25868,7 +25858,7 @@
               </a:rPr>
               <a:t>Caso de Uso - Gerente</a:t>
             </a:r>
-            <a:endParaRPr lang="es-ES" sz="3200" b="0" strike="noStrike" spc="-1">
+            <a:endParaRPr lang="es-ES" sz="3200" b="0" strike="noStrike" spc="-1" dirty="0">
               <a:latin typeface="Arial"/>
             </a:endParaRPr>
           </a:p>
@@ -25880,14 +25870,15 @@
           <p:cNvPicPr/>
           <p:nvPr/>
         </p:nvPicPr>
-        <p:blipFill>
+        <p:blipFill rotWithShape="1">
           <a:blip r:embed="rId2"/>
+          <a:srcRect b="1759"/>
           <a:stretch/>
         </p:blipFill>
         <p:spPr>
           <a:xfrm>
             <a:off x="1333080" y="1838160"/>
-            <a:ext cx="7413840" cy="4489200"/>
+            <a:ext cx="7413840" cy="4410240"/>
           </a:xfrm>
           <a:prstGeom prst="rect">
             <a:avLst/>
@@ -25954,7 +25945,7 @@
           <a:fontRef idx="minor"/>
         </p:style>
         <p:txBody>
-          <a:bodyPr lIns="0" tIns="0" rIns="0" bIns="0" anchor="b">
+          <a:bodyPr lIns="0" tIns="0" rIns="0" bIns="0" anchor="ctr">
             <a:noAutofit/>
           </a:bodyPr>
           <a:lstStyle/>
@@ -25965,16 +25956,26 @@
               </a:lnSpc>
             </a:pPr>
             <a:r>
-              <a:rPr lang="es-ES" sz="3200" b="1" strike="noStrike" spc="-1">
+              <a:rPr lang="es-ES" sz="3200" b="1" strike="noStrike" spc="-1" dirty="0">
                 <a:solidFill>
                   <a:srgbClr val="FFFFFF"/>
                 </a:solidFill>
                 <a:latin typeface="Source Sans Pro Black"/>
                 <a:ea typeface="DejaVu Sans"/>
               </a:rPr>
-              <a:t>Caso de Uso - Superusuario</a:t>
+              <a:t>Caso de Uso - </a:t>
             </a:r>
-            <a:endParaRPr lang="es-ES" sz="3200" b="0" strike="noStrike" spc="-1">
+            <a:r>
+              <a:rPr lang="es-ES" sz="3200" b="1" strike="noStrike" spc="-1" dirty="0" err="1">
+                <a:solidFill>
+                  <a:srgbClr val="FFFFFF"/>
+                </a:solidFill>
+                <a:latin typeface="Source Sans Pro Black"/>
+                <a:ea typeface="DejaVu Sans"/>
+              </a:rPr>
+              <a:t>Superusuario</a:t>
+            </a:r>
+            <a:endParaRPr lang="es-ES" sz="3200" b="0" strike="noStrike" spc="-1" dirty="0">
               <a:latin typeface="Arial"/>
             </a:endParaRPr>
           </a:p>
@@ -26166,18 +26167,13 @@
           <a:fontRef idx="minor"/>
         </p:style>
         <p:txBody>
-          <a:bodyPr lIns="0" tIns="0" rIns="0" bIns="0" anchor="b">
+          <a:bodyPr lIns="0" tIns="0" rIns="0" bIns="0" anchor="ctr">
             <a:noAutofit/>
           </a:bodyPr>
           <a:lstStyle/>
           <a:p>
-            <a:pPr>
-              <a:lnSpc>
-                <a:spcPct val="100000"/>
-              </a:lnSpc>
-            </a:pPr>
             <a:r>
-              <a:rPr lang="es-ES" sz="3200" b="1" strike="noStrike" spc="-1">
+              <a:rPr lang="es-ES" sz="3200" b="1" strike="noStrike" spc="-1" dirty="0">
                 <a:solidFill>
                   <a:srgbClr val="FFFFFF"/>
                 </a:solidFill>
@@ -26186,7 +26182,7 @@
               </a:rPr>
               <a:t>¿En que consiste el Sistema?</a:t>
             </a:r>
-            <a:endParaRPr lang="es-ES" sz="3200" b="0" strike="noStrike" spc="-1">
+            <a:endParaRPr lang="es-ES" sz="3200" b="0" strike="noStrike" spc="-1" dirty="0">
               <a:latin typeface="Arial"/>
             </a:endParaRPr>
           </a:p>
@@ -26392,7 +26388,7 @@
           <a:fontRef idx="minor"/>
         </p:style>
         <p:txBody>
-          <a:bodyPr lIns="0" tIns="0" rIns="0" bIns="0" anchor="b">
+          <a:bodyPr lIns="0" tIns="0" rIns="0" bIns="0" anchor="ctr">
             <a:noAutofit/>
           </a:bodyPr>
           <a:lstStyle/>
@@ -26461,7 +26457,7 @@
         </p:nvSpPr>
         <p:spPr>
           <a:xfrm>
-            <a:off x="382080" y="738760"/>
+            <a:off x="382080" y="560960"/>
             <a:ext cx="9071640" cy="488160"/>
           </a:xfrm>
           <a:prstGeom prst="rect">
@@ -26829,7 +26825,7 @@
         </p:nvSpPr>
         <p:spPr>
           <a:xfrm>
-            <a:off x="422720" y="738760"/>
+            <a:off x="422720" y="522860"/>
             <a:ext cx="9071640" cy="488160"/>
           </a:xfrm>
           <a:prstGeom prst="rect">
@@ -26901,7 +26897,7 @@
         </p:blipFill>
         <p:spPr>
           <a:xfrm>
-            <a:off x="469080" y="2808000"/>
+            <a:off x="329380" y="2808000"/>
             <a:ext cx="4426560" cy="2521800"/>
           </a:xfrm>
           <a:prstGeom prst="rect">
@@ -27034,6 +27030,42 @@
           </a:p>
         </p:txBody>
       </p:sp>
+      <p:cxnSp>
+        <p:nvCxnSpPr>
+          <p:cNvPr id="5" name="Conector recto 4"/>
+          <p:cNvCxnSpPr/>
+          <p:nvPr/>
+        </p:nvCxnSpPr>
+        <p:spPr>
+          <a:xfrm>
+            <a:off x="4989512" y="1499860"/>
+            <a:ext cx="0" cy="5086677"/>
+          </a:xfrm>
+          <a:prstGeom prst="line">
+            <a:avLst/>
+          </a:prstGeom>
+          <a:ln w="38100">
+            <a:solidFill>
+              <a:srgbClr val="E74C3C"/>
+            </a:solidFill>
+            <a:prstDash val="dash"/>
+          </a:ln>
+        </p:spPr>
+        <p:style>
+          <a:lnRef idx="1">
+            <a:schemeClr val="accent1"/>
+          </a:lnRef>
+          <a:fillRef idx="0">
+            <a:schemeClr val="accent1"/>
+          </a:fillRef>
+          <a:effectRef idx="0">
+            <a:schemeClr val="accent1"/>
+          </a:effectRef>
+          <a:fontRef idx="minor">
+            <a:schemeClr val="tx1"/>
+          </a:fontRef>
+        </p:style>
+      </p:cxnSp>
     </p:spTree>
   </p:cSld>
   <p:clrMapOvr>
@@ -27071,7 +27103,7 @@
         </p:blipFill>
         <p:spPr>
           <a:xfrm>
-            <a:off x="503640" y="2929320"/>
+            <a:off x="351240" y="2929320"/>
             <a:ext cx="4426560" cy="2062080"/>
           </a:xfrm>
           <a:prstGeom prst="rect">
@@ -27218,7 +27250,7 @@
         </p:nvSpPr>
         <p:spPr>
           <a:xfrm>
-            <a:off x="422720" y="738760"/>
+            <a:off x="422720" y="497460"/>
             <a:ext cx="9071640" cy="488160"/>
           </a:xfrm>
           <a:prstGeom prst="rect">
@@ -27268,6 +27300,42 @@
           </a:p>
         </p:txBody>
       </p:sp>
+      <p:cxnSp>
+        <p:nvCxnSpPr>
+          <p:cNvPr id="5" name="Conector recto 4"/>
+          <p:cNvCxnSpPr/>
+          <p:nvPr/>
+        </p:nvCxnSpPr>
+        <p:spPr>
+          <a:xfrm>
+            <a:off x="4887912" y="1550660"/>
+            <a:ext cx="0" cy="5086677"/>
+          </a:xfrm>
+          <a:prstGeom prst="line">
+            <a:avLst/>
+          </a:prstGeom>
+          <a:ln w="38100">
+            <a:solidFill>
+              <a:srgbClr val="E74C3C"/>
+            </a:solidFill>
+            <a:prstDash val="dash"/>
+          </a:ln>
+        </p:spPr>
+        <p:style>
+          <a:lnRef idx="1">
+            <a:schemeClr val="accent1"/>
+          </a:lnRef>
+          <a:fillRef idx="0">
+            <a:schemeClr val="accent1"/>
+          </a:fillRef>
+          <a:effectRef idx="0">
+            <a:schemeClr val="accent1"/>
+          </a:effectRef>
+          <a:fontRef idx="minor">
+            <a:schemeClr val="tx1"/>
+          </a:fontRef>
+        </p:style>
+      </p:cxnSp>
     </p:spTree>
   </p:cSld>
   <p:clrMapOvr>
@@ -27301,7 +27369,7 @@
         </p:nvSpPr>
         <p:spPr>
           <a:xfrm>
-            <a:off x="432000" y="664920"/>
+            <a:off x="432000" y="499820"/>
             <a:ext cx="9071640" cy="488160"/>
           </a:xfrm>
           <a:prstGeom prst="rect">
@@ -27336,16 +27404,26 @@
               </a:lnSpc>
             </a:pPr>
             <a:r>
-              <a:rPr lang="es-ES" sz="3200" b="1" strike="noStrike" spc="-1">
+              <a:rPr lang="es-ES" sz="3200" b="1" strike="noStrike" spc="-1" dirty="0" err="1">
                 <a:solidFill>
                   <a:srgbClr val="FFFFFF"/>
                 </a:solidFill>
                 <a:latin typeface="Source Sans Pro Black"/>
                 <a:ea typeface="DejaVu Sans"/>
               </a:rPr>
-              <a:t>Testing de la aplicación</a:t>
+              <a:t>Testing</a:t>
             </a:r>
-            <a:endParaRPr lang="es-ES" sz="3200" b="0" strike="noStrike" spc="-1">
+            <a:r>
+              <a:rPr lang="es-ES" sz="3200" b="1" strike="noStrike" spc="-1" dirty="0">
+                <a:solidFill>
+                  <a:srgbClr val="FFFFFF"/>
+                </a:solidFill>
+                <a:latin typeface="Source Sans Pro Black"/>
+                <a:ea typeface="DejaVu Sans"/>
+              </a:rPr>
+              <a:t> de la aplicación</a:t>
+            </a:r>
+            <a:endParaRPr lang="es-ES" sz="3200" b="0" strike="noStrike" spc="-1" dirty="0">
               <a:latin typeface="Arial"/>
             </a:endParaRPr>
           </a:p>
@@ -27431,7 +27509,7 @@
           <a:fontRef idx="minor"/>
         </p:style>
         <p:txBody>
-          <a:bodyPr lIns="0" tIns="0" rIns="0" bIns="0" anchor="b">
+          <a:bodyPr lIns="0" tIns="0" rIns="0" bIns="0" anchor="ctr">
             <a:noAutofit/>
           </a:bodyPr>
           <a:lstStyle/>
@@ -27442,7 +27520,7 @@
               </a:lnSpc>
             </a:pPr>
             <a:r>
-              <a:rPr lang="es-ES" sz="3200" b="1" strike="noStrike" spc="-1">
+              <a:rPr lang="es-ES" sz="3200" b="1" strike="noStrike" spc="-1" dirty="0">
                 <a:solidFill>
                   <a:srgbClr val="FFFFFF"/>
                 </a:solidFill>
@@ -27451,7 +27529,7 @@
               </a:rPr>
               <a:t>GRUPO DE DESARROLLO ADD</a:t>
             </a:r>
-            <a:endParaRPr lang="es-ES" sz="3200" b="0" strike="noStrike" spc="-1">
+            <a:endParaRPr lang="es-ES" sz="3200" b="0" strike="noStrike" spc="-1" dirty="0">
               <a:latin typeface="Arial"/>
             </a:endParaRPr>
           </a:p>
@@ -27583,17 +27661,20 @@
               </a:lnSpc>
             </a:pPr>
             <a:r>
-              <a:rPr lang="es-ES" sz="4400" b="0" strike="noStrike" spc="-1">
+              <a:rPr lang="es-ES" sz="3200" b="1" strike="noStrike" spc="-1" dirty="0">
                 <a:solidFill>
-                  <a:srgbClr val="000000"/>
+                  <a:schemeClr val="bg1"/>
                 </a:solidFill>
-                <a:latin typeface="Arial"/>
+                <a:latin typeface="Source Sans Pro Black"/>
                 <a:ea typeface="DejaVu Sans"/>
               </a:rPr>
               <a:t>¿Cómo nos hemos organizado?</a:t>
             </a:r>
-            <a:endParaRPr lang="es-ES" sz="4400" b="0" strike="noStrike" spc="-1">
-              <a:latin typeface="Arial"/>
+            <a:endParaRPr lang="es-ES" sz="3200" b="1" strike="noStrike" spc="-1" dirty="0">
+              <a:solidFill>
+                <a:schemeClr val="bg1"/>
+              </a:solidFill>
+              <a:latin typeface="Source Sans Pro Black"/>
             </a:endParaRPr>
           </a:p>
         </p:txBody>
@@ -27775,23 +27856,26 @@
           </a:bodyPr>
           <a:lstStyle/>
           <a:p>
-            <a:pPr algn="ctr">
+            <a:pPr>
               <a:lnSpc>
                 <a:spcPct val="90000"/>
               </a:lnSpc>
             </a:pPr>
             <a:r>
-              <a:rPr lang="es-ES" sz="4400" b="0" strike="noStrike" spc="-1">
+              <a:rPr lang="es-ES" sz="4000" b="1" strike="noStrike" spc="-1" dirty="0">
                 <a:solidFill>
-                  <a:srgbClr val="000000"/>
+                  <a:schemeClr val="bg1"/>
                 </a:solidFill>
-                <a:latin typeface="Arial"/>
+                <a:latin typeface="Source Sans Pro Black"/>
                 <a:ea typeface="DejaVu Sans"/>
               </a:rPr>
               <a:t>Entrevistas 1 y 2</a:t>
             </a:r>
-            <a:endParaRPr lang="es-ES" sz="4400" b="0" strike="noStrike" spc="-1">
-              <a:latin typeface="Arial"/>
+            <a:endParaRPr lang="es-ES" sz="4000" b="1" strike="noStrike" spc="-1" dirty="0">
+              <a:solidFill>
+                <a:schemeClr val="bg1"/>
+              </a:solidFill>
+              <a:latin typeface="Source Sans Pro Black"/>
             </a:endParaRPr>
           </a:p>
         </p:txBody>
@@ -28041,7 +28125,7 @@
               <a:buChar char="•"/>
             </a:pPr>
             <a:r>
-              <a:rPr lang="es-ES" sz="3200" b="0" strike="noStrike" spc="-1">
+              <a:rPr lang="es-ES" sz="3200" b="0" strike="noStrike" spc="-1" dirty="0">
                 <a:solidFill>
                   <a:srgbClr val="000000"/>
                 </a:solidFill>
@@ -28050,7 +28134,7 @@
               </a:rPr>
               <a:t>Resultados:</a:t>
             </a:r>
-            <a:endParaRPr lang="es-ES" sz="3200" b="0" strike="noStrike" spc="-1">
+            <a:endParaRPr lang="es-ES" sz="3200" b="0" strike="noStrike" spc="-1" dirty="0">
               <a:latin typeface="Arial"/>
             </a:endParaRPr>
           </a:p>
@@ -28060,7 +28144,7 @@
                 <a:spcPct val="100000"/>
               </a:lnSpc>
             </a:pPr>
-            <a:endParaRPr lang="es-ES" sz="3200" b="0" strike="noStrike" spc="-1">
+            <a:endParaRPr lang="es-ES" sz="3200" b="0" strike="noStrike" spc="-1" dirty="0">
               <a:latin typeface="Arial"/>
             </a:endParaRPr>
           </a:p>
@@ -28071,7 +28155,7 @@
               </a:lnSpc>
             </a:pPr>
             <a:r>
-              <a:rPr lang="es-ES" sz="1800" b="0" strike="noStrike" spc="-1">
+              <a:rPr lang="es-ES" sz="1800" b="0" strike="noStrike" spc="-1" dirty="0">
                 <a:solidFill>
                   <a:srgbClr val="000000"/>
                 </a:solidFill>
@@ -28080,7 +28164,7 @@
               </a:rPr>
               <a:t>- Obtuvimos gran parte de los requisitos mas generales del sistema.</a:t>
             </a:r>
-            <a:endParaRPr lang="es-ES" sz="1800" b="0" strike="noStrike" spc="-1">
+            <a:endParaRPr lang="es-ES" sz="1800" b="0" strike="noStrike" spc="-1" dirty="0">
               <a:latin typeface="Arial"/>
             </a:endParaRPr>
           </a:p>
@@ -28090,7 +28174,7 @@
                 <a:spcPct val="100000"/>
               </a:lnSpc>
             </a:pPr>
-            <a:endParaRPr lang="es-ES" sz="1800" b="0" strike="noStrike" spc="-1">
+            <a:endParaRPr lang="es-ES" sz="1800" b="0" strike="noStrike" spc="-1" dirty="0">
               <a:latin typeface="Arial"/>
             </a:endParaRPr>
           </a:p>
@@ -28101,7 +28185,7 @@
               </a:lnSpc>
             </a:pPr>
             <a:r>
-              <a:rPr lang="es-ES" sz="1800" b="0" strike="noStrike" spc="-1">
+              <a:rPr lang="es-ES" sz="1800" b="0" strike="noStrike" spc="-1" dirty="0">
                 <a:solidFill>
                   <a:srgbClr val="000000"/>
                 </a:solidFill>
@@ -28110,7 +28194,7 @@
               </a:rPr>
               <a:t>- Conseguimos una idea clara de lo que se pretendía desarrollar. </a:t>
             </a:r>
-            <a:endParaRPr lang="es-ES" sz="1800" b="0" strike="noStrike" spc="-1">
+            <a:endParaRPr lang="es-ES" sz="1800" b="0" strike="noStrike" spc="-1" dirty="0">
               <a:latin typeface="Arial"/>
             </a:endParaRPr>
           </a:p>
@@ -28118,27 +28202,63 @@
       </p:sp>
       <p:pic>
         <p:nvPicPr>
-          <p:cNvPr id="514" name="Imagen 513"/>
-          <p:cNvPicPr/>
+          <p:cNvPr id="3" name="Imagen 2"/>
+          <p:cNvPicPr>
+            <a:picLocks noChangeAspect="1"/>
+          </p:cNvPicPr>
           <p:nvPr/>
         </p:nvPicPr>
-        <p:blipFill>
+        <p:blipFill rotWithShape="1">
           <a:blip r:embed="rId2"/>
+          <a:srcRect l="7972" t="4595" r="5872" b="4041"/>
           <a:stretch/>
         </p:blipFill>
         <p:spPr>
           <a:xfrm>
-            <a:off x="6034320" y="1709640"/>
-            <a:ext cx="3829320" cy="5037840"/>
-          </a:xfrm>
-          <a:prstGeom prst="rect">
-            <a:avLst/>
-          </a:prstGeom>
-          <a:ln>
-            <a:noFill/>
+            <a:off x="6489700" y="1673821"/>
+            <a:ext cx="3200400" cy="4892239"/>
+          </a:xfrm>
+          <a:prstGeom prst="rect">
+            <a:avLst/>
+          </a:prstGeom>
+        </p:spPr>
+      </p:pic>
+      <p:cxnSp>
+        <p:nvCxnSpPr>
+          <p:cNvPr id="9" name="Conector recto 8"/>
+          <p:cNvCxnSpPr/>
+          <p:nvPr/>
+        </p:nvCxnSpPr>
+        <p:spPr>
+          <a:xfrm>
+            <a:off x="6170612" y="1550660"/>
+            <a:ext cx="0" cy="5086677"/>
+          </a:xfrm>
+          <a:prstGeom prst="line">
+            <a:avLst/>
+          </a:prstGeom>
+          <a:ln w="38100">
+            <a:solidFill>
+              <a:srgbClr val="E74C3C"/>
+            </a:solidFill>
+            <a:prstDash val="dash"/>
           </a:ln>
         </p:spPr>
-      </p:pic>
+        <p:style>
+          <a:lnRef idx="1">
+            <a:schemeClr val="accent1"/>
+          </a:lnRef>
+          <a:fillRef idx="0">
+            <a:schemeClr val="accent1"/>
+          </a:fillRef>
+          <a:effectRef idx="0">
+            <a:schemeClr val="accent1"/>
+          </a:effectRef>
+          <a:fontRef idx="minor">
+            <a:schemeClr val="tx1"/>
+          </a:fontRef>
+        </p:style>
+      </p:cxnSp>
     </p:spTree>
   </p:cSld>
   <p:clrMapOvr>
@@ -28207,51 +28327,42 @@
               </a:lnSpc>
             </a:pPr>
             <a:r>
-              <a:rPr lang="es-ES" sz="4400" b="0" strike="noStrike" spc="-1">
+              <a:rPr lang="es-ES" sz="4000" b="1" strike="noStrike" spc="-1" dirty="0">
                 <a:solidFill>
-                  <a:srgbClr val="000000"/>
+                  <a:schemeClr val="bg1"/>
                 </a:solidFill>
-                <a:latin typeface="Arial"/>
+                <a:latin typeface="Source Sans Pro Black"/>
                 <a:ea typeface="DejaVu Sans"/>
               </a:rPr>
               <a:t>Análisis de riesgos</a:t>
             </a:r>
-            <a:endParaRPr lang="es-ES" sz="4400" b="0" strike="noStrike" spc="-1">
-              <a:latin typeface="Arial"/>
+            <a:endParaRPr lang="es-ES" sz="4000" b="1" strike="noStrike" spc="-1" dirty="0">
+              <a:solidFill>
+                <a:schemeClr val="bg1"/>
+              </a:solidFill>
+              <a:latin typeface="Source Sans Pro Black"/>
             </a:endParaRPr>
           </a:p>
         </p:txBody>
       </p:sp>
       <p:pic>
         <p:nvPicPr>
-          <p:cNvPr id="3" name="Imagen 2">
-            <a:extLst>
-              <a:ext uri="{FF2B5EF4-FFF2-40B4-BE49-F238E27FC236}">
-                <a16:creationId xmlns:a16="http://schemas.microsoft.com/office/drawing/2014/main" id="{F36C8B16-F5B9-44F9-A78B-CCE587101393}"/>
-              </a:ext>
-            </a:extLst>
-          </p:cNvPr>
+          <p:cNvPr id="5" name="Imagen 4"/>
           <p:cNvPicPr>
             <a:picLocks noChangeAspect="1"/>
           </p:cNvPicPr>
           <p:nvPr/>
         </p:nvPicPr>
         <p:blipFill>
-          <a:blip r:embed="rId2">
-            <a:extLst>
-              <a:ext uri="{28A0092B-C50C-407E-A947-70E740481C1C}">
-                <a14:useLocalDpi xmlns:a14="http://schemas.microsoft.com/office/drawing/2010/main" val="0"/>
-              </a:ext>
-            </a:extLst>
-          </a:blip>
+          <a:blip r:embed="rId2"/>
           <a:stretch>
             <a:fillRect/>
           </a:stretch>
         </p:blipFill>
         <p:spPr>
           <a:xfrm>
-            <a:off x="504000" y="1912142"/>
-            <a:ext cx="9204102" cy="4145757"/>
+            <a:off x="499753" y="1695390"/>
+            <a:ext cx="9075527" cy="4616510"/>
           </a:xfrm>
           <a:prstGeom prst="rect">
             <a:avLst/>
@@ -28320,23 +28431,26 @@
           </a:bodyPr>
           <a:lstStyle/>
           <a:p>
-            <a:pPr algn="ctr">
+            <a:pPr>
               <a:lnSpc>
                 <a:spcPct val="90000"/>
               </a:lnSpc>
             </a:pPr>
             <a:r>
-              <a:rPr lang="es-ES" sz="4400" b="0" strike="noStrike" spc="-1">
+              <a:rPr lang="es-ES" sz="4000" b="1" strike="noStrike" spc="-1" dirty="0">
                 <a:solidFill>
-                  <a:srgbClr val="000000"/>
+                  <a:schemeClr val="bg1"/>
                 </a:solidFill>
-                <a:latin typeface="Arial"/>
+                <a:latin typeface="Source Sans Pro Black"/>
                 <a:ea typeface="DejaVu Sans"/>
               </a:rPr>
               <a:t>Entrevistas 3 y 4</a:t>
             </a:r>
-            <a:endParaRPr lang="es-ES" sz="4400" b="0" strike="noStrike" spc="-1">
-              <a:latin typeface="Arial"/>
+            <a:endParaRPr lang="es-ES" sz="4000" b="1" strike="noStrike" spc="-1" dirty="0">
+              <a:solidFill>
+                <a:schemeClr val="bg1"/>
+              </a:solidFill>
+              <a:latin typeface="Source Sans Pro Black"/>
             </a:endParaRPr>
           </a:p>
         </p:txBody>
@@ -28681,27 +28795,64 @@
       </p:sp>
       <p:pic>
         <p:nvPicPr>
-          <p:cNvPr id="520" name="Imagen 519"/>
-          <p:cNvPicPr/>
+          <p:cNvPr id="2" name="Imagen 1"/>
+          <p:cNvPicPr>
+            <a:picLocks noChangeAspect="1"/>
+          </p:cNvPicPr>
           <p:nvPr/>
         </p:nvPicPr>
         <p:blipFill>
           <a:blip r:embed="rId2"/>
-          <a:stretch/>
+          <a:stretch>
+            <a:fillRect/>
+          </a:stretch>
         </p:blipFill>
         <p:spPr>
           <a:xfrm>
-            <a:off x="6076800" y="1546552"/>
-            <a:ext cx="3815640" cy="5211360"/>
-          </a:xfrm>
-          <a:prstGeom prst="rect">
-            <a:avLst/>
-          </a:prstGeom>
-          <a:ln>
-            <a:noFill/>
+            <a:off x="6284912" y="1468437"/>
+            <a:ext cx="3505200" cy="5334000"/>
+          </a:xfrm>
+          <a:prstGeom prst="rect">
+            <a:avLst/>
+          </a:prstGeom>
+        </p:spPr>
+      </p:pic>
+      <p:cxnSp>
+        <p:nvCxnSpPr>
+          <p:cNvPr id="8" name="Conector recto 7"/>
+          <p:cNvCxnSpPr/>
+          <p:nvPr/>
+        </p:nvCxnSpPr>
+        <p:spPr>
+          <a:xfrm>
+            <a:off x="6221412" y="1550660"/>
+            <a:ext cx="0" cy="5086677"/>
+          </a:xfrm>
+          <a:prstGeom prst="line">
+            <a:avLst/>
+          </a:prstGeom>
+          <a:ln w="38100">
+            <a:solidFill>
+              <a:srgbClr val="E74C3C"/>
+            </a:solidFill>
+            <a:prstDash val="dash"/>
           </a:ln>
         </p:spPr>
-      </p:pic>
+        <p:style>
+          <a:lnRef idx="1">
+            <a:schemeClr val="accent1"/>
+          </a:lnRef>
+          <a:fillRef idx="0">
+            <a:schemeClr val="accent1"/>
+          </a:fillRef>
+          <a:effectRef idx="0">
+            <a:schemeClr val="accent1"/>
+          </a:effectRef>
+          <a:fontRef idx="minor">
+            <a:schemeClr val="tx1"/>
+          </a:fontRef>
+        </p:style>
+      </p:cxnSp>
     </p:spTree>
   </p:cSld>
   <p:clrMapOvr>
@@ -28772,7 +28923,7 @@
             <a:r>
               <a:rPr lang="es-ES" sz="3200" b="1" strike="noStrike" spc="-1" dirty="0">
                 <a:solidFill>
-                  <a:srgbClr val="C9211E"/>
+                  <a:srgbClr val="FF5050"/>
                 </a:solidFill>
                 <a:latin typeface="Source Sans Pro Black"/>
                 <a:ea typeface="DejaVu Sans"/>
@@ -28780,6 +28931,9 @@
               <a:t>Prototipo Interfaz - Cliente</a:t>
             </a:r>
             <a:endParaRPr lang="es-ES" sz="3200" b="0" strike="noStrike" spc="-1" dirty="0">
+              <a:solidFill>
+                <a:srgbClr val="FF5050"/>
+              </a:solidFill>
               <a:latin typeface="Arial"/>
             </a:endParaRPr>
           </a:p>
@@ -28924,7 +29078,7 @@
             <a:r>
               <a:rPr lang="es-ES" sz="3200" b="1" strike="noStrike" spc="-1" dirty="0">
                 <a:solidFill>
-                  <a:srgbClr val="C9211E"/>
+                  <a:srgbClr val="FF5050"/>
                 </a:solidFill>
                 <a:latin typeface="Source Sans Pro Black"/>
                 <a:ea typeface="DejaVu Sans"/>
@@ -28932,6 +29086,9 @@
               <a:t>Prototipo Interfaz - Personal</a:t>
             </a:r>
             <a:endParaRPr lang="es-ES" sz="3200" b="0" strike="noStrike" spc="-1" dirty="0">
+              <a:solidFill>
+                <a:srgbClr val="FF5050"/>
+              </a:solidFill>
               <a:latin typeface="Arial"/>
             </a:endParaRPr>
           </a:p>
@@ -29030,7 +29187,7 @@
             <a:r>
               <a:rPr lang="es-ES" sz="3200" b="1" strike="noStrike" spc="-1" dirty="0">
                 <a:solidFill>
-                  <a:srgbClr val="C9211E"/>
+                  <a:srgbClr val="FF5050"/>
                 </a:solidFill>
                 <a:latin typeface="Source Sans Pro Black"/>
                 <a:ea typeface="DejaVu Sans"/>
@@ -29038,6 +29195,9 @@
               <a:t>Prototipo Interfaz - Gerente</a:t>
             </a:r>
             <a:endParaRPr lang="es-ES" sz="3200" b="0" strike="noStrike" spc="-1" dirty="0">
+              <a:solidFill>
+                <a:srgbClr val="FF5050"/>
+              </a:solidFill>
               <a:latin typeface="Arial"/>
             </a:endParaRPr>
           </a:p>

</xml_diff>

<commit_message>
Cambios en caso uso cliente y diagrama de clases
</commit_message>
<xml_diff>
--- a/Material/Presentación/Presentacion Final.pptx
+++ b/Material/Presentación/Presentacion Final.pptx
@@ -150,6 +150,10 @@
 <p:cmAuthorLst xmlns:a="http://schemas.openxmlformats.org/drawingml/2006/main" xmlns:r="http://schemas.openxmlformats.org/officeDocument/2006/relationships" xmlns:p="http://schemas.openxmlformats.org/presentationml/2006/main">
   <p:cmAuthor id="0" name="Enrique Lopez" initials="EL" lastIdx="1" clrIdx="0"/>
 </p:cmAuthorLst>
+</file>
+
+<file path=ppt/revisionInfo.xml><?xml version="1.0" encoding="utf-8"?>
+<p1510:revInfo xmlns:a="http://schemas.openxmlformats.org/drawingml/2006/main" xmlns:r="http://schemas.openxmlformats.org/officeDocument/2006/relationships" xmlns:p1510="http://schemas.microsoft.com/office/powerpoint/2015/10/main"/>
 </file>
 
 <file path=ppt/slideLayouts/slideLayout1.xml><?xml version="1.0" encoding="utf-8"?>
@@ -25635,25 +25639,31 @@
       </p:sp>
       <p:pic>
         <p:nvPicPr>
-          <p:cNvPr id="543" name="Imagen 2"/>
-          <p:cNvPicPr/>
+          <p:cNvPr id="3" name="Imagen 2"/>
+          <p:cNvPicPr>
+            <a:picLocks noChangeAspect="1"/>
+          </p:cNvPicPr>
           <p:nvPr/>
         </p:nvPicPr>
-        <p:blipFill>
-          <a:blip r:embed="rId2"/>
+        <p:blipFill rotWithShape="1">
+          <a:blip r:embed="rId2">
+            <a:extLst>
+              <a:ext uri="{28A0092B-C50C-407E-A947-70E740481C1C}">
+                <a14:useLocalDpi xmlns:a14="http://schemas.microsoft.com/office/drawing/2010/main" val="0"/>
+              </a:ext>
+            </a:extLst>
+          </a:blip>
+          <a:srcRect l="1076" t="7578" r="17748" b="15693"/>
           <a:stretch/>
         </p:blipFill>
         <p:spPr>
           <a:xfrm>
-            <a:off x="1087200" y="1916280"/>
-            <a:ext cx="7578000" cy="4323240"/>
-          </a:xfrm>
-          <a:prstGeom prst="rect">
-            <a:avLst/>
-          </a:prstGeom>
-          <a:ln>
-            <a:noFill/>
-          </a:ln>
+            <a:off x="947547" y="1689314"/>
+            <a:ext cx="8183105" cy="4510007"/>
+          </a:xfrm>
+          <a:prstGeom prst="rect">
+            <a:avLst/>
+          </a:prstGeom>
         </p:spPr>
       </p:pic>
     </p:spTree>
@@ -26384,7 +26394,7 @@
       </p:sp>
       <p:pic>
         <p:nvPicPr>
-          <p:cNvPr id="4" name="Imagen 3"/>
+          <p:cNvPr id="5" name="Imagen 4"/>
           <p:cNvPicPr>
             <a:picLocks noChangeAspect="1"/>
           </p:cNvPicPr>
@@ -26405,7 +26415,7 @@
         <p:spPr>
           <a:xfrm>
             <a:off x="360000" y="1258200"/>
-            <a:ext cx="9321208" cy="5892787"/>
+            <a:ext cx="9258002" cy="5863799"/>
           </a:xfrm>
           <a:prstGeom prst="rect">
             <a:avLst/>
@@ -28109,7 +28119,7 @@
         <p:spPr>
           <a:xfrm>
             <a:off x="187560" y="3990240"/>
-            <a:ext cx="5859360" cy="2436120"/>
+            <a:ext cx="5859360" cy="2460758"/>
           </a:xfrm>
           <a:prstGeom prst="rect">
             <a:avLst/>
@@ -28185,7 +28195,7 @@
                 <a:latin typeface="Arial"/>
                 <a:ea typeface="DejaVu Sans"/>
               </a:rPr>
-              <a:t>- Obtuvimos gran parte de los requisitos mas generales del sistema.</a:t>
+              <a:t>- Obtuvimos gran parte de los requisitos más generales del sistema.</a:t>
             </a:r>
             <a:endParaRPr lang="es-ES" sz="1800" b="0" strike="noStrike" spc="-1" dirty="0">
               <a:latin typeface="Arial"/>

</xml_diff>